<commit_message>
Use HTTPS as the wss is used
</commit_message>
<xml_diff>
--- a/src/main/resources/HW10PPT.pptx
+++ b/src/main/resources/HW10PPT.pptx
@@ -136,7 +136,7 @@
       </p14:sectionLst>
     </p:ext>
     <p:ext uri="{EFAFB233-063F-42B5-8137-9DF3F51BA10A}">
-      <p15:sldGuideLst xmlns="" xmlns:p15="http://schemas.microsoft.com/office/powerpoint/2012/main">
+      <p15:sldGuideLst xmlns:p15="http://schemas.microsoft.com/office/powerpoint/2012/main">
         <p15:guide id="1" orient="horz" pos="2160">
           <p15:clr>
             <a:srgbClr val="A4A3A4"/>
@@ -235,7 +235,7 @@
           <a:p>
             <a:fld id="{25417687-C97F-A145-B56E-68023E710746}" type="datetimeFigureOut">
               <a:rPr lang="en-US" smtClean="0"/>
-              <a:t>11/27/18</a:t>
+              <a:t>11/28/2018</a:t>
             </a:fld>
             <a:endParaRPr lang="en-US"/>
           </a:p>
@@ -2398,7 +2398,7 @@
           <a:p>
             <a:fld id="{9A008B6F-2147-4593-A96F-6E7B2F4A2759}" type="datetimeFigureOut">
               <a:rPr lang="en-US" smtClean="0"/>
-              <a:t>11/27/18</a:t>
+              <a:t>11/28/2018</a:t>
             </a:fld>
             <a:endParaRPr lang="en-US"/>
           </a:p>
@@ -2577,7 +2577,7 @@
           <a:p>
             <a:fld id="{9A008B6F-2147-4593-A96F-6E7B2F4A2759}" type="datetimeFigureOut">
               <a:rPr lang="en-US" smtClean="0"/>
-              <a:t>11/27/18</a:t>
+              <a:t>11/28/2018</a:t>
             </a:fld>
             <a:endParaRPr lang="en-US"/>
           </a:p>
@@ -2728,7 +2728,7 @@
           <a:p>
             <a:fld id="{9A008B6F-2147-4593-A96F-6E7B2F4A2759}" type="datetimeFigureOut">
               <a:rPr lang="en-US" smtClean="0"/>
-              <a:t>11/27/18</a:t>
+              <a:t>11/28/2018</a:t>
             </a:fld>
             <a:endParaRPr lang="en-US"/>
           </a:p>
@@ -4553,7 +4553,7 @@
           <a:p>
             <a:fld id="{9A008B6F-2147-4593-A96F-6E7B2F4A2759}" type="datetimeFigureOut">
               <a:rPr lang="en-US" smtClean="0"/>
-              <a:t>11/27/18</a:t>
+              <a:t>11/28/2018</a:t>
             </a:fld>
             <a:endParaRPr lang="en-US"/>
           </a:p>
@@ -6422,7 +6422,7 @@
           <a:p>
             <a:fld id="{9A008B6F-2147-4593-A96F-6E7B2F4A2759}" type="datetimeFigureOut">
               <a:rPr lang="en-US" smtClean="0"/>
-              <a:t>11/27/18</a:t>
+              <a:t>11/28/2018</a:t>
             </a:fld>
             <a:endParaRPr lang="en-US"/>
           </a:p>
@@ -6534,7 +6534,7 @@
           <a:p>
             <a:fld id="{9A008B6F-2147-4593-A96F-6E7B2F4A2759}" type="datetimeFigureOut">
               <a:rPr lang="en-US" smtClean="0"/>
-              <a:t>11/27/18</a:t>
+              <a:t>11/28/2018</a:t>
             </a:fld>
             <a:endParaRPr lang="en-US"/>
           </a:p>
@@ -7072,7 +7072,7 @@
           <a:p>
             <a:fld id="{9A008B6F-2147-4593-A96F-6E7B2F4A2759}" type="datetimeFigureOut">
               <a:rPr lang="en-US" smtClean="0"/>
-              <a:t>11/27/18</a:t>
+              <a:t>11/28/2018</a:t>
             </a:fld>
             <a:endParaRPr lang="en-US"/>
           </a:p>
@@ -7184,7 +7184,7 @@
           <a:p>
             <a:fld id="{9A008B6F-2147-4593-A96F-6E7B2F4A2759}" type="datetimeFigureOut">
               <a:rPr lang="en-US" smtClean="0"/>
-              <a:t>11/27/18</a:t>
+              <a:t>11/28/2018</a:t>
             </a:fld>
             <a:endParaRPr lang="en-US"/>
           </a:p>
@@ -8895,7 +8895,7 @@
           <a:p>
             <a:fld id="{9A008B6F-2147-4593-A96F-6E7B2F4A2759}" type="datetimeFigureOut">
               <a:rPr lang="en-US" smtClean="0"/>
-              <a:t>11/27/18</a:t>
+              <a:t>11/28/2018</a:t>
             </a:fld>
             <a:endParaRPr lang="en-US"/>
           </a:p>
@@ -9046,7 +9046,7 @@
           <a:p>
             <a:fld id="{9A008B6F-2147-4593-A96F-6E7B2F4A2759}" type="datetimeFigureOut">
               <a:rPr lang="en-US" smtClean="0"/>
-              <a:t>11/27/18</a:t>
+              <a:t>11/28/2018</a:t>
             </a:fld>
             <a:endParaRPr lang="en-US"/>
           </a:p>
@@ -12661,7 +12661,7 @@
           <a:p>
             <a:fld id="{9A008B6F-2147-4593-A96F-6E7B2F4A2759}" type="datetimeFigureOut">
               <a:rPr lang="en-US" smtClean="0"/>
-              <a:t>11/27/18</a:t>
+              <a:t>11/28/2018</a:t>
             </a:fld>
             <a:endParaRPr lang="en-US"/>
           </a:p>
@@ -14520,7 +14520,7 @@
           <a:p>
             <a:fld id="{9A008B6F-2147-4593-A96F-6E7B2F4A2759}" type="datetimeFigureOut">
               <a:rPr lang="en-US" smtClean="0"/>
-              <a:t>11/27/18</a:t>
+              <a:t>11/28/2018</a:t>
             </a:fld>
             <a:endParaRPr lang="en-US"/>
           </a:p>
@@ -15049,10 +15049,10 @@
           <p:cNvPr id="8" name="Rectangle 7">
             <a:extLst>
               <a:ext uri="{FF2B5EF4-FFF2-40B4-BE49-F238E27FC236}">
-                <a16:creationId xmlns="" xmlns:a16="http://schemas.microsoft.com/office/drawing/2014/main" id="{8C6E698C-8155-4B8B-BDC9-B7299772B509}"/>
+                <a16:creationId xmlns:a16="http://schemas.microsoft.com/office/drawing/2014/main" id="{8C6E698C-8155-4B8B-BDC9-B7299772B509}"/>
               </a:ext>
               <a:ext uri="{C183D7F6-B498-43B3-948B-1728B52AA6E4}">
-                <adec:decorative xmlns="" xmlns:adec="http://schemas.microsoft.com/office/drawing/2017/decorative" val="1"/>
+                <adec:decorative xmlns:adec="http://schemas.microsoft.com/office/drawing/2017/decorative" val="1"/>
               </a:ext>
             </a:extLst>
           </p:cNvPr>
@@ -15062,7 +15062,7 @@
           <p:nvPr>
             <p:extLst>
               <p:ext uri="{386F3935-93C4-4BCD-93E2-E3B085C9AB24}">
-                <p16:designElem xmlns="" xmlns:p16="http://schemas.microsoft.com/office/powerpoint/2015/main" val="1"/>
+                <p16:designElem xmlns:p16="http://schemas.microsoft.com/office/powerpoint/2015/main" val="1"/>
               </p:ext>
             </p:extLst>
           </p:nvPr>
@@ -15109,7 +15109,7 @@
           <p:cNvPr id="2" name="Title 1">
             <a:extLst>
               <a:ext uri="{FF2B5EF4-FFF2-40B4-BE49-F238E27FC236}">
-                <a16:creationId xmlns="" xmlns:a16="http://schemas.microsoft.com/office/drawing/2014/main" id="{851112BE-281F-4BF9-906C-997DF4C7A02F}"/>
+                <a16:creationId xmlns:a16="http://schemas.microsoft.com/office/drawing/2014/main" id="{851112BE-281F-4BF9-906C-997DF4C7A02F}"/>
               </a:ext>
             </a:extLst>
           </p:cNvPr>
@@ -15177,7 +15177,7 @@
           <p:cNvPr id="3" name="Subtitle 2">
             <a:extLst>
               <a:ext uri="{FF2B5EF4-FFF2-40B4-BE49-F238E27FC236}">
-                <a16:creationId xmlns="" xmlns:a16="http://schemas.microsoft.com/office/drawing/2014/main" id="{38114735-D296-4F43-949F-A7501E98755C}"/>
+                <a16:creationId xmlns:a16="http://schemas.microsoft.com/office/drawing/2014/main" id="{38114735-D296-4F43-949F-A7501E98755C}"/>
               </a:ext>
             </a:extLst>
           </p:cNvPr>
@@ -15206,23 +15206,7 @@
                   <a:srgbClr val="000000"/>
                 </a:solidFill>
               </a:rPr>
-              <a:t>11</a:t>
-            </a:r>
-            <a:r>
-              <a:rPr lang="en-US" sz="4000" dirty="0" smtClean="0">
-                <a:solidFill>
-                  <a:srgbClr val="000000"/>
-                </a:solidFill>
-              </a:rPr>
-              <a:t>/28/</a:t>
-            </a:r>
-            <a:r>
-              <a:rPr lang="en-US" sz="4000" dirty="0">
-                <a:solidFill>
-                  <a:srgbClr val="000000"/>
-                </a:solidFill>
-              </a:rPr>
-              <a:t>2018</a:t>
+              <a:t>11/28/2018</a:t>
             </a:r>
           </a:p>
         </p:txBody>
@@ -15232,10 +15216,10 @@
           <p:cNvPr id="10" name="Straight Connector 9">
             <a:extLst>
               <a:ext uri="{FF2B5EF4-FFF2-40B4-BE49-F238E27FC236}">
-                <a16:creationId xmlns="" xmlns:a16="http://schemas.microsoft.com/office/drawing/2014/main" id="{09525C9A-1972-4836-BA7A-706C946EF4DA}"/>
+                <a16:creationId xmlns:a16="http://schemas.microsoft.com/office/drawing/2014/main" id="{09525C9A-1972-4836-BA7A-706C946EF4DA}"/>
               </a:ext>
               <a:ext uri="{C183D7F6-B498-43B3-948B-1728B52AA6E4}">
-                <adec:decorative xmlns="" xmlns:adec="http://schemas.microsoft.com/office/drawing/2017/decorative" val="1"/>
+                <adec:decorative xmlns:adec="http://schemas.microsoft.com/office/drawing/2017/decorative" val="1"/>
               </a:ext>
             </a:extLst>
           </p:cNvPr>
@@ -15245,7 +15229,7 @@
           <p:nvPr>
             <p:extLst>
               <p:ext uri="{386F3935-93C4-4BCD-93E2-E3B085C9AB24}">
-                <p16:designElem xmlns="" xmlns:p16="http://schemas.microsoft.com/office/powerpoint/2015/main" val="1"/>
+                <p16:designElem xmlns:p16="http://schemas.microsoft.com/office/powerpoint/2015/main" val="1"/>
               </p:ext>
             </p:extLst>
           </p:nvPr>
@@ -15284,10 +15268,10 @@
           <p:cNvPr id="12" name="Rectangle 11">
             <a:extLst>
               <a:ext uri="{FF2B5EF4-FFF2-40B4-BE49-F238E27FC236}">
-                <a16:creationId xmlns="" xmlns:a16="http://schemas.microsoft.com/office/drawing/2014/main" id="{8A549DE7-671D-4575-AF43-858FD99981CF}"/>
+                <a16:creationId xmlns:a16="http://schemas.microsoft.com/office/drawing/2014/main" id="{8A549DE7-671D-4575-AF43-858FD99981CF}"/>
               </a:ext>
               <a:ext uri="{C183D7F6-B498-43B3-948B-1728B52AA6E4}">
-                <adec:decorative xmlns="" xmlns:adec="http://schemas.microsoft.com/office/drawing/2017/decorative" val="1"/>
+                <adec:decorative xmlns:adec="http://schemas.microsoft.com/office/drawing/2017/decorative" val="1"/>
               </a:ext>
             </a:extLst>
           </p:cNvPr>
@@ -15297,7 +15281,7 @@
           <p:nvPr>
             <p:extLst>
               <p:ext uri="{386F3935-93C4-4BCD-93E2-E3B085C9AB24}">
-                <p16:designElem xmlns="" xmlns:p16="http://schemas.microsoft.com/office/powerpoint/2015/main" val="1"/>
+                <p16:designElem xmlns:p16="http://schemas.microsoft.com/office/powerpoint/2015/main" val="1"/>
               </p:ext>
             </p:extLst>
           </p:nvPr>
@@ -15339,10 +15323,10 @@
           <p:cNvPr id="14" name="Rectangle 13">
             <a:extLst>
               <a:ext uri="{FF2B5EF4-FFF2-40B4-BE49-F238E27FC236}">
-                <a16:creationId xmlns="" xmlns:a16="http://schemas.microsoft.com/office/drawing/2014/main" id="{C22D9B36-9BE7-472B-8808-7E0D6810738F}"/>
+                <a16:creationId xmlns:a16="http://schemas.microsoft.com/office/drawing/2014/main" id="{C22D9B36-9BE7-472B-8808-7E0D6810738F}"/>
               </a:ext>
               <a:ext uri="{C183D7F6-B498-43B3-948B-1728B52AA6E4}">
-                <adec:decorative xmlns="" xmlns:adec="http://schemas.microsoft.com/office/drawing/2017/decorative" val="1"/>
+                <adec:decorative xmlns:adec="http://schemas.microsoft.com/office/drawing/2017/decorative" val="1"/>
               </a:ext>
             </a:extLst>
           </p:cNvPr>
@@ -15352,7 +15336,7 @@
           <p:nvPr>
             <p:extLst>
               <p:ext uri="{386F3935-93C4-4BCD-93E2-E3B085C9AB24}">
-                <p16:designElem xmlns="" xmlns:p16="http://schemas.microsoft.com/office/powerpoint/2015/main" val="1"/>
+                <p16:designElem xmlns:p16="http://schemas.microsoft.com/office/powerpoint/2015/main" val="1"/>
               </p:ext>
             </p:extLst>
           </p:nvPr>
@@ -15432,10 +15416,10 @@
           <p:cNvPr id="7" name="Rectangle 6">
             <a:extLst>
               <a:ext uri="{FF2B5EF4-FFF2-40B4-BE49-F238E27FC236}">
-                <a16:creationId xmlns="" xmlns:a16="http://schemas.microsoft.com/office/drawing/2014/main" id="{52C0B2E1-0268-42EC-ABD3-94F81A05BCBD}"/>
+                <a16:creationId xmlns:a16="http://schemas.microsoft.com/office/drawing/2014/main" id="{52C0B2E1-0268-42EC-ABD3-94F81A05BCBD}"/>
               </a:ext>
               <a:ext uri="{C183D7F6-B498-43B3-948B-1728B52AA6E4}">
-                <adec:decorative xmlns="" xmlns:adec="http://schemas.microsoft.com/office/drawing/2017/decorative" val="1"/>
+                <adec:decorative xmlns:adec="http://schemas.microsoft.com/office/drawing/2017/decorative" val="1"/>
               </a:ext>
             </a:extLst>
           </p:cNvPr>
@@ -15445,7 +15429,7 @@
           <p:nvPr>
             <p:extLst>
               <p:ext uri="{386F3935-93C4-4BCD-93E2-E3B085C9AB24}">
-                <p16:designElem xmlns="" xmlns:p16="http://schemas.microsoft.com/office/powerpoint/2015/main" val="1"/>
+                <p16:designElem xmlns:p16="http://schemas.microsoft.com/office/powerpoint/2015/main" val="1"/>
               </p:ext>
             </p:extLst>
           </p:nvPr>
@@ -15487,10 +15471,10 @@
           <p:cNvPr id="9" name="Rectangle 8">
             <a:extLst>
               <a:ext uri="{FF2B5EF4-FFF2-40B4-BE49-F238E27FC236}">
-                <a16:creationId xmlns="" xmlns:a16="http://schemas.microsoft.com/office/drawing/2014/main" id="{7D2256B4-48EA-40FC-BBC0-AA1EE6E0080C}"/>
+                <a16:creationId xmlns:a16="http://schemas.microsoft.com/office/drawing/2014/main" id="{7D2256B4-48EA-40FC-BBC0-AA1EE6E0080C}"/>
               </a:ext>
               <a:ext uri="{C183D7F6-B498-43B3-948B-1728B52AA6E4}">
-                <adec:decorative xmlns="" xmlns:adec="http://schemas.microsoft.com/office/drawing/2017/decorative" val="1"/>
+                <adec:decorative xmlns:adec="http://schemas.microsoft.com/office/drawing/2017/decorative" val="1"/>
               </a:ext>
             </a:extLst>
           </p:cNvPr>
@@ -15500,7 +15484,7 @@
           <p:nvPr>
             <p:extLst>
               <p:ext uri="{386F3935-93C4-4BCD-93E2-E3B085C9AB24}">
-                <p16:designElem xmlns="" xmlns:p16="http://schemas.microsoft.com/office/powerpoint/2015/main" val="1"/>
+                <p16:designElem xmlns:p16="http://schemas.microsoft.com/office/powerpoint/2015/main" val="1"/>
               </p:ext>
             </p:extLst>
           </p:nvPr>
@@ -15542,10 +15526,10 @@
           <p:cNvPr id="11" name="Straight Connector 10">
             <a:extLst>
               <a:ext uri="{FF2B5EF4-FFF2-40B4-BE49-F238E27FC236}">
-                <a16:creationId xmlns="" xmlns:a16="http://schemas.microsoft.com/office/drawing/2014/main" id="{3D44BCCA-102D-4A9D-B1E4-2450CAF0B05E}"/>
+                <a16:creationId xmlns:a16="http://schemas.microsoft.com/office/drawing/2014/main" id="{3D44BCCA-102D-4A9D-B1E4-2450CAF0B05E}"/>
               </a:ext>
               <a:ext uri="{C183D7F6-B498-43B3-948B-1728B52AA6E4}">
-                <adec:decorative xmlns="" xmlns:adec="http://schemas.microsoft.com/office/drawing/2017/decorative" val="1"/>
+                <adec:decorative xmlns:adec="http://schemas.microsoft.com/office/drawing/2017/decorative" val="1"/>
               </a:ext>
             </a:extLst>
           </p:cNvPr>
@@ -15555,7 +15539,7 @@
           <p:nvPr>
             <p:extLst>
               <p:ext uri="{386F3935-93C4-4BCD-93E2-E3B085C9AB24}">
-                <p16:designElem xmlns="" xmlns:p16="http://schemas.microsoft.com/office/powerpoint/2015/main" val="1"/>
+                <p16:designElem xmlns:p16="http://schemas.microsoft.com/office/powerpoint/2015/main" val="1"/>
               </p:ext>
             </p:extLst>
           </p:nvPr>
@@ -15597,10 +15581,10 @@
           <p:cNvPr id="13" name="Rectangle 12">
             <a:extLst>
               <a:ext uri="{FF2B5EF4-FFF2-40B4-BE49-F238E27FC236}">
-                <a16:creationId xmlns="" xmlns:a16="http://schemas.microsoft.com/office/drawing/2014/main" id="{FBDCECDC-EEE3-4128-AA5E-82A8C08796E8}"/>
+                <a16:creationId xmlns:a16="http://schemas.microsoft.com/office/drawing/2014/main" id="{FBDCECDC-EEE3-4128-AA5E-82A8C08796E8}"/>
               </a:ext>
               <a:ext uri="{C183D7F6-B498-43B3-948B-1728B52AA6E4}">
-                <adec:decorative xmlns="" xmlns:adec="http://schemas.microsoft.com/office/drawing/2017/decorative" val="1"/>
+                <adec:decorative xmlns:adec="http://schemas.microsoft.com/office/drawing/2017/decorative" val="1"/>
               </a:ext>
             </a:extLst>
           </p:cNvPr>
@@ -15610,7 +15594,7 @@
           <p:nvPr>
             <p:extLst>
               <p:ext uri="{386F3935-93C4-4BCD-93E2-E3B085C9AB24}">
-                <p16:designElem xmlns="" xmlns:p16="http://schemas.microsoft.com/office/powerpoint/2015/main" val="1"/>
+                <p16:designElem xmlns:p16="http://schemas.microsoft.com/office/powerpoint/2015/main" val="1"/>
               </p:ext>
             </p:extLst>
           </p:nvPr>
@@ -15657,7 +15641,7 @@
           <p:cNvPr id="2" name="Title 1">
             <a:extLst>
               <a:ext uri="{FF2B5EF4-FFF2-40B4-BE49-F238E27FC236}">
-                <a16:creationId xmlns="" xmlns:a16="http://schemas.microsoft.com/office/drawing/2014/main" id="{701FBBE9-B805-49C1-B2A8-585E443C8491}"/>
+                <a16:creationId xmlns:a16="http://schemas.microsoft.com/office/drawing/2014/main" id="{701FBBE9-B805-49C1-B2A8-585E443C8491}"/>
               </a:ext>
             </a:extLst>
           </p:cNvPr>
@@ -15699,10 +15683,10 @@
           <p:cNvPr id="15" name="Rectangle 14">
             <a:extLst>
               <a:ext uri="{FF2B5EF4-FFF2-40B4-BE49-F238E27FC236}">
-                <a16:creationId xmlns="" xmlns:a16="http://schemas.microsoft.com/office/drawing/2014/main" id="{4260EDE0-989C-4E16-AF94-F652294D828E}"/>
+                <a16:creationId xmlns:a16="http://schemas.microsoft.com/office/drawing/2014/main" id="{4260EDE0-989C-4E16-AF94-F652294D828E}"/>
               </a:ext>
               <a:ext uri="{C183D7F6-B498-43B3-948B-1728B52AA6E4}">
-                <adec:decorative xmlns="" xmlns:adec="http://schemas.microsoft.com/office/drawing/2017/decorative" val="1"/>
+                <adec:decorative xmlns:adec="http://schemas.microsoft.com/office/drawing/2017/decorative" val="1"/>
               </a:ext>
             </a:extLst>
           </p:cNvPr>
@@ -15712,7 +15696,7 @@
           <p:nvPr>
             <p:extLst>
               <p:ext uri="{386F3935-93C4-4BCD-93E2-E3B085C9AB24}">
-                <p16:designElem xmlns="" xmlns:p16="http://schemas.microsoft.com/office/powerpoint/2015/main" val="1"/>
+                <p16:designElem xmlns:p16="http://schemas.microsoft.com/office/powerpoint/2015/main" val="1"/>
               </p:ext>
             </p:extLst>
           </p:nvPr>
@@ -15754,10 +15738,10 @@
           <p:cNvPr id="17" name="Rectangle 16">
             <a:extLst>
               <a:ext uri="{FF2B5EF4-FFF2-40B4-BE49-F238E27FC236}">
-                <a16:creationId xmlns="" xmlns:a16="http://schemas.microsoft.com/office/drawing/2014/main" id="{1F3985C0-E548-44D2-B30E-F3E42DADE133}"/>
+                <a16:creationId xmlns:a16="http://schemas.microsoft.com/office/drawing/2014/main" id="{1F3985C0-E548-44D2-B30E-F3E42DADE133}"/>
               </a:ext>
               <a:ext uri="{C183D7F6-B498-43B3-948B-1728B52AA6E4}">
-                <adec:decorative xmlns="" xmlns:adec="http://schemas.microsoft.com/office/drawing/2017/decorative" val="1"/>
+                <adec:decorative xmlns:adec="http://schemas.microsoft.com/office/drawing/2017/decorative" val="1"/>
               </a:ext>
             </a:extLst>
           </p:cNvPr>
@@ -15767,7 +15751,7 @@
           <p:nvPr>
             <p:extLst>
               <p:ext uri="{386F3935-93C4-4BCD-93E2-E3B085C9AB24}">
-                <p16:designElem xmlns="" xmlns:p16="http://schemas.microsoft.com/office/powerpoint/2015/main" val="1"/>
+                <p16:designElem xmlns:p16="http://schemas.microsoft.com/office/powerpoint/2015/main" val="1"/>
               </p:ext>
             </p:extLst>
           </p:nvPr>
@@ -15847,10 +15831,10 @@
           <p:cNvPr id="137" name="Rectangle 136">
             <a:extLst>
               <a:ext uri="{FF2B5EF4-FFF2-40B4-BE49-F238E27FC236}">
-                <a16:creationId xmlns="" xmlns:a16="http://schemas.microsoft.com/office/drawing/2014/main" id="{52ABB703-2B0E-4C3B-B4A2-F3973548E561}"/>
+                <a16:creationId xmlns:a16="http://schemas.microsoft.com/office/drawing/2014/main" id="{52ABB703-2B0E-4C3B-B4A2-F3973548E561}"/>
               </a:ext>
               <a:ext uri="{C183D7F6-B498-43B3-948B-1728B52AA6E4}">
-                <adec:decorative xmlns="" xmlns:adec="http://schemas.microsoft.com/office/drawing/2017/decorative" val="1"/>
+                <adec:decorative xmlns:adec="http://schemas.microsoft.com/office/drawing/2017/decorative" val="1"/>
               </a:ext>
             </a:extLst>
           </p:cNvPr>
@@ -15860,7 +15844,7 @@
           <p:nvPr>
             <p:extLst>
               <p:ext uri="{386F3935-93C4-4BCD-93E2-E3B085C9AB24}">
-                <p16:designElem xmlns="" xmlns:p16="http://schemas.microsoft.com/office/powerpoint/2015/main" val="1"/>
+                <p16:designElem xmlns:p16="http://schemas.microsoft.com/office/powerpoint/2015/main" val="1"/>
               </p:ext>
             </p:extLst>
           </p:nvPr>
@@ -16066,10 +16050,10 @@
           <p:cNvPr id="139" name="Straight Connector 138">
             <a:extLst>
               <a:ext uri="{FF2B5EF4-FFF2-40B4-BE49-F238E27FC236}">
-                <a16:creationId xmlns="" xmlns:a16="http://schemas.microsoft.com/office/drawing/2014/main" id="{9C21570E-E159-49A6-9891-FA397B7A92D3}"/>
+                <a16:creationId xmlns:a16="http://schemas.microsoft.com/office/drawing/2014/main" id="{9C21570E-E159-49A6-9891-FA397B7A92D3}"/>
               </a:ext>
               <a:ext uri="{C183D7F6-B498-43B3-948B-1728B52AA6E4}">
-                <adec:decorative xmlns="" xmlns:adec="http://schemas.microsoft.com/office/drawing/2017/decorative" val="1"/>
+                <adec:decorative xmlns:adec="http://schemas.microsoft.com/office/drawing/2017/decorative" val="1"/>
               </a:ext>
             </a:extLst>
           </p:cNvPr>
@@ -16079,7 +16063,7 @@
           <p:nvPr>
             <p:extLst>
               <p:ext uri="{386F3935-93C4-4BCD-93E2-E3B085C9AB24}">
-                <p16:designElem xmlns="" xmlns:p16="http://schemas.microsoft.com/office/powerpoint/2015/main" val="1"/>
+                <p16:designElem xmlns:p16="http://schemas.microsoft.com/office/powerpoint/2015/main" val="1"/>
               </p:ext>
             </p:extLst>
           </p:nvPr>
@@ -16122,10 +16106,10 @@
           <p:cNvPr id="141" name="Rectangle 140">
             <a:extLst>
               <a:ext uri="{FF2B5EF4-FFF2-40B4-BE49-F238E27FC236}">
-                <a16:creationId xmlns="" xmlns:a16="http://schemas.microsoft.com/office/drawing/2014/main" id="{E95DA498-D9A2-4DA9-B9DA-B3776E08CF7E}"/>
+                <a16:creationId xmlns:a16="http://schemas.microsoft.com/office/drawing/2014/main" id="{E95DA498-D9A2-4DA9-B9DA-B3776E08CF7E}"/>
               </a:ext>
               <a:ext uri="{C183D7F6-B498-43B3-948B-1728B52AA6E4}">
-                <adec:decorative xmlns="" xmlns:adec="http://schemas.microsoft.com/office/drawing/2017/decorative" val="1"/>
+                <adec:decorative xmlns:adec="http://schemas.microsoft.com/office/drawing/2017/decorative" val="1"/>
               </a:ext>
             </a:extLst>
           </p:cNvPr>
@@ -16135,7 +16119,7 @@
           <p:nvPr>
             <p:extLst>
               <p:ext uri="{386F3935-93C4-4BCD-93E2-E3B085C9AB24}">
-                <p16:designElem xmlns="" xmlns:p16="http://schemas.microsoft.com/office/powerpoint/2015/main" val="1"/>
+                <p16:designElem xmlns:p16="http://schemas.microsoft.com/office/powerpoint/2015/main" val="1"/>
               </p:ext>
             </p:extLst>
           </p:nvPr>
@@ -16177,10 +16161,10 @@
           <p:cNvPr id="143" name="Rectangle 142">
             <a:extLst>
               <a:ext uri="{FF2B5EF4-FFF2-40B4-BE49-F238E27FC236}">
-                <a16:creationId xmlns="" xmlns:a16="http://schemas.microsoft.com/office/drawing/2014/main" id="{82A73093-4B9D-420D-B17E-52293703A1D4}"/>
+                <a16:creationId xmlns:a16="http://schemas.microsoft.com/office/drawing/2014/main" id="{82A73093-4B9D-420D-B17E-52293703A1D4}"/>
               </a:ext>
               <a:ext uri="{C183D7F6-B498-43B3-948B-1728B52AA6E4}">
-                <adec:decorative xmlns="" xmlns:adec="http://schemas.microsoft.com/office/drawing/2017/decorative" val="1"/>
+                <adec:decorative xmlns:adec="http://schemas.microsoft.com/office/drawing/2017/decorative" val="1"/>
               </a:ext>
             </a:extLst>
           </p:cNvPr>
@@ -16190,7 +16174,7 @@
           <p:nvPr>
             <p:extLst>
               <p:ext uri="{386F3935-93C4-4BCD-93E2-E3B085C9AB24}">
-                <p16:designElem xmlns="" xmlns:p16="http://schemas.microsoft.com/office/powerpoint/2015/main" val="1"/>
+                <p16:designElem xmlns:p16="http://schemas.microsoft.com/office/powerpoint/2015/main" val="1"/>
               </p:ext>
             </p:extLst>
           </p:nvPr>
@@ -16372,13 +16356,8 @@
             </a:r>
             <a:r>
               <a:rPr lang="en-US" altLang="zh-CN" dirty="0"/>
-              <a:t>client</a:t>
-            </a:r>
-            <a:r>
-              <a:rPr lang="en-US" altLang="zh-CN" dirty="0" smtClean="0"/>
-              <a:t>:</a:t>
-            </a:r>
-            <a:endParaRPr lang="en-US" altLang="zh-CN" dirty="0"/>
+              <a:t>client:</a:t>
+            </a:r>
           </a:p>
           <a:p>
             <a:pPr marL="587693" lvl="1" indent="-285750">
@@ -16390,14 +16369,13 @@
               <a:t>allows the view to update the room information </a:t>
             </a:r>
             <a:r>
-              <a:rPr lang="zh-CN" altLang="zh-CN" dirty="0" smtClean="0"/>
+              <a:rPr lang="zh-CN" altLang="zh-CN" dirty="0"/>
               <a:t>(</a:t>
             </a:r>
             <a:r>
-              <a:rPr lang="en-US" altLang="zh-CN" dirty="0" smtClean="0"/>
+              <a:rPr lang="en-US" altLang="zh-CN" dirty="0"/>
               <a:t>left and middle columns)</a:t>
             </a:r>
-            <a:endParaRPr lang="en-US" altLang="zh-CN" dirty="0"/>
           </a:p>
           <a:p>
             <a:pPr marL="587693" lvl="1" indent="-285750">
@@ -16414,11 +16392,7 @@
             </a:r>
             <a:r>
               <a:rPr lang="en-US" altLang="zh-CN" dirty="0"/>
-              <a:t>column</a:t>
-            </a:r>
-            <a:r>
-              <a:rPr lang="en-US" altLang="zh-CN" dirty="0" smtClean="0"/>
-              <a:t>)</a:t>
+              <a:t>column)</a:t>
             </a:r>
           </a:p>
           <a:p>
@@ -16426,7 +16400,7 @@
               <a:buFont typeface="Arial"/>
               <a:buChar char="•"/>
             </a:pPr>
-            <a:endParaRPr lang="en-US" altLang="zh-CN" dirty="0" smtClean="0"/>
+            <a:endParaRPr lang="en-US" altLang="zh-CN" dirty="0"/>
           </a:p>
           <a:p>
             <a:pPr>
@@ -16434,39 +16408,39 @@
               <a:buChar char="v"/>
             </a:pPr>
             <a:r>
-              <a:rPr lang="en-US" altLang="zh-CN" dirty="0" smtClean="0"/>
+              <a:rPr lang="en-US" altLang="zh-CN" dirty="0"/>
               <a:t>We</a:t>
             </a:r>
             <a:r>
-              <a:rPr lang="zh-CN" altLang="en-US" dirty="0" smtClean="0"/>
+              <a:rPr lang="zh-CN" altLang="en-US" dirty="0"/>
               <a:t> </a:t>
             </a:r>
             <a:r>
-              <a:rPr lang="en-US" altLang="zh-CN" dirty="0" smtClean="0"/>
+              <a:rPr lang="en-US" altLang="zh-CN" dirty="0"/>
               <a:t>use</a:t>
             </a:r>
             <a:r>
-              <a:rPr lang="zh-CN" altLang="en-US" dirty="0" smtClean="0"/>
+              <a:rPr lang="zh-CN" altLang="en-US" dirty="0"/>
               <a:t> </a:t>
             </a:r>
             <a:r>
-              <a:rPr lang="en-US" altLang="zh-CN" dirty="0" smtClean="0"/>
+              <a:rPr lang="en-US" altLang="zh-CN" dirty="0"/>
               <a:t>special</a:t>
             </a:r>
             <a:r>
-              <a:rPr lang="zh-CN" altLang="en-US" dirty="0" smtClean="0"/>
+              <a:rPr lang="zh-CN" altLang="en-US" dirty="0"/>
               <a:t> </a:t>
             </a:r>
             <a:r>
-              <a:rPr lang="en-US" altLang="zh-CN" dirty="0" smtClean="0"/>
+              <a:rPr lang="en-US" altLang="zh-CN" dirty="0"/>
               <a:t>character</a:t>
             </a:r>
             <a:r>
-              <a:rPr lang="zh-CN" altLang="en-US" dirty="0" smtClean="0"/>
+              <a:rPr lang="zh-CN" altLang="en-US" dirty="0"/>
               <a:t> </a:t>
             </a:r>
             <a:r>
-              <a:rPr lang="en-US" altLang="zh-CN" dirty="0" smtClean="0"/>
+              <a:rPr lang="en-US" altLang="zh-CN" dirty="0"/>
               <a:t>‘|’ as delimiter, so that inputs can contain space</a:t>
             </a:r>
           </a:p>
@@ -16519,18 +16493,13 @@
           <a:lstStyle/>
           <a:p>
             <a:r>
-              <a:rPr lang="en-US" b="1" dirty="0" smtClean="0">
+              <a:rPr lang="en-US" b="1" dirty="0">
                 <a:solidFill>
                   <a:srgbClr val="000000"/>
                 </a:solidFill>
               </a:rPr>
               <a:t>Design decisions	</a:t>
             </a:r>
-            <a:endParaRPr lang="en-US" b="1" dirty="0">
-              <a:solidFill>
-                <a:srgbClr val="000000"/>
-              </a:solidFill>
-            </a:endParaRPr>
           </a:p>
         </p:txBody>
       </p:sp>
@@ -16584,7 +16553,7 @@
               <a:buChar char="v"/>
             </a:pPr>
             <a:r>
-              <a:rPr lang="en-US" altLang="zh-CN" dirty="0" smtClean="0"/>
+              <a:rPr lang="en-US" altLang="zh-CN" dirty="0"/>
               <a:t>To view the private message from user B, user A needs to click “chat” button first.</a:t>
             </a:r>
           </a:p>
@@ -16593,7 +16562,7 @@
               <a:buFont typeface="Wingdings" charset="2"/>
               <a:buChar char="v"/>
             </a:pPr>
-            <a:endParaRPr lang="en-US" altLang="zh-CN" dirty="0" smtClean="0"/>
+            <a:endParaRPr lang="en-US" altLang="zh-CN" dirty="0"/>
           </a:p>
           <a:p>
             <a:pPr>
@@ -16601,7 +16570,7 @@
               <a:buChar char="v"/>
             </a:pPr>
             <a:r>
-              <a:rPr lang="en-US" altLang="zh-CN" dirty="0" smtClean="0"/>
+              <a:rPr lang="en-US" altLang="zh-CN" dirty="0"/>
               <a:t>Broadcast messages and notifications are shown in the “My room” column only. They are not shown in private chat box.</a:t>
             </a:r>
           </a:p>
@@ -16654,18 +16623,13 @@
           <a:lstStyle/>
           <a:p>
             <a:r>
-              <a:rPr lang="en-US" b="1" dirty="0" smtClean="0">
+              <a:rPr lang="en-US" b="1" dirty="0">
                 <a:solidFill>
                   <a:srgbClr val="000000"/>
                 </a:solidFill>
               </a:rPr>
               <a:t>Design decisions	</a:t>
             </a:r>
-            <a:endParaRPr lang="en-US" b="1" dirty="0">
-              <a:solidFill>
-                <a:srgbClr val="000000"/>
-              </a:solidFill>
-            </a:endParaRPr>
           </a:p>
         </p:txBody>
       </p:sp>
@@ -16717,18 +16681,13 @@
           <a:lstStyle/>
           <a:p>
             <a:r>
-              <a:rPr lang="en-US" b="1" dirty="0" smtClean="0">
+              <a:rPr lang="en-US" b="1" dirty="0">
                 <a:solidFill>
                   <a:srgbClr val="000000"/>
                 </a:solidFill>
               </a:rPr>
               <a:t>Controller </a:t>
             </a:r>
-            <a:endParaRPr lang="en-US" b="1" dirty="0">
-              <a:solidFill>
-                <a:srgbClr val="000000"/>
-              </a:solidFill>
-            </a:endParaRPr>
           </a:p>
         </p:txBody>
       </p:sp>
@@ -16737,7 +16696,7 @@
           <p:cNvPr id="5" name="TextBox 4">
             <a:extLst>
               <a:ext uri="{FF2B5EF4-FFF2-40B4-BE49-F238E27FC236}">
-                <a16:creationId xmlns="" xmlns:a16="http://schemas.microsoft.com/office/drawing/2014/main" id="{84F02290-10A9-4B22-A3D0-BD285571D0DB}"/>
+                <a16:creationId xmlns:a16="http://schemas.microsoft.com/office/drawing/2014/main" id="{84F02290-10A9-4B22-A3D0-BD285571D0DB}"/>
               </a:ext>
             </a:extLst>
           </p:cNvPr>
@@ -16765,14 +16724,14 @@
               <a:buChar char="•"/>
             </a:pPr>
             <a:r>
-              <a:rPr lang="en-US" sz="2800" b="1" dirty="0" err="1" smtClean="0">
+              <a:rPr lang="en-US" sz="2800" b="1" dirty="0" err="1">
                 <a:solidFill>
                   <a:srgbClr val="000000"/>
                 </a:solidFill>
               </a:rPr>
               <a:t>ChatAppController</a:t>
             </a:r>
-            <a:endParaRPr lang="en-US" sz="2800" b="1" dirty="0" smtClean="0">
+            <a:endParaRPr lang="en-US" sz="2800" b="1" dirty="0">
               <a:solidFill>
                 <a:srgbClr val="000000"/>
               </a:solidFill>
@@ -16784,7 +16743,7 @@
               <a:buChar char="•"/>
             </a:pPr>
             <a:r>
-              <a:rPr lang="en-US" sz="2800" dirty="0" smtClean="0">
+              <a:rPr lang="en-US" sz="2800" dirty="0">
                 <a:solidFill>
                   <a:srgbClr val="000000"/>
                 </a:solidFill>
@@ -16792,7 +16751,7 @@
               <a:t>Setup</a:t>
             </a:r>
             <a:r>
-              <a:rPr lang="zh-CN" altLang="en-US" sz="2800" dirty="0" smtClean="0">
+              <a:rPr lang="zh-CN" altLang="en-US" sz="2800" dirty="0">
                 <a:solidFill>
                   <a:srgbClr val="000000"/>
                 </a:solidFill>
@@ -16800,7 +16759,7 @@
               <a:t> </a:t>
             </a:r>
             <a:r>
-              <a:rPr lang="en-US" altLang="zh-CN" sz="2800" dirty="0" err="1" smtClean="0">
+              <a:rPr lang="en-US" altLang="zh-CN" sz="2800" dirty="0" err="1">
                 <a:solidFill>
                   <a:srgbClr val="000000"/>
                 </a:solidFill>
@@ -16808,7 +16767,7 @@
               <a:t>Websocket</a:t>
             </a:r>
             <a:r>
-              <a:rPr lang="zh-CN" altLang="en-US" sz="2800" dirty="0" smtClean="0">
+              <a:rPr lang="zh-CN" altLang="en-US" sz="2800" dirty="0">
                 <a:solidFill>
                   <a:srgbClr val="000000"/>
                 </a:solidFill>
@@ -16816,7 +16775,7 @@
               <a:t> </a:t>
             </a:r>
             <a:r>
-              <a:rPr lang="en-US" altLang="zh-CN" sz="2800" dirty="0" smtClean="0">
+              <a:rPr lang="en-US" altLang="zh-CN" sz="2800" dirty="0">
                 <a:solidFill>
                   <a:srgbClr val="000000"/>
                 </a:solidFill>
@@ -16824,7 +16783,7 @@
               <a:t>on</a:t>
             </a:r>
             <a:r>
-              <a:rPr lang="zh-CN" altLang="en-US" sz="2800" dirty="0" smtClean="0">
+              <a:rPr lang="zh-CN" altLang="en-US" sz="2800" dirty="0">
                 <a:solidFill>
                   <a:srgbClr val="000000"/>
                 </a:solidFill>
@@ -16832,7 +16791,7 @@
               <a:t> </a:t>
             </a:r>
             <a:r>
-              <a:rPr lang="en-US" altLang="zh-CN" sz="2800" dirty="0" smtClean="0">
+              <a:rPr lang="en-US" altLang="zh-CN" sz="2800" dirty="0">
                 <a:solidFill>
                   <a:srgbClr val="000000"/>
                 </a:solidFill>
@@ -16840,7 +16799,7 @@
               <a:t>server</a:t>
             </a:r>
             <a:r>
-              <a:rPr lang="zh-CN" altLang="en-US" sz="2800" dirty="0" smtClean="0">
+              <a:rPr lang="zh-CN" altLang="en-US" sz="2800" dirty="0">
                 <a:solidFill>
                   <a:srgbClr val="000000"/>
                 </a:solidFill>
@@ -16848,7 +16807,7 @@
               <a:t> </a:t>
             </a:r>
             <a:r>
-              <a:rPr lang="en-US" altLang="zh-CN" sz="2800" dirty="0" smtClean="0">
+              <a:rPr lang="en-US" altLang="zh-CN" sz="2800" dirty="0">
                 <a:solidFill>
                   <a:srgbClr val="000000"/>
                 </a:solidFill>
@@ -16862,7 +16821,7 @@
               <a:buChar char="•"/>
             </a:pPr>
             <a:r>
-              <a:rPr lang="en-US" sz="2800" dirty="0" smtClean="0">
+              <a:rPr lang="en-US" sz="2800" dirty="0">
                 <a:solidFill>
                   <a:srgbClr val="000000"/>
                 </a:solidFill>
@@ -16870,7 +16829,7 @@
               <a:t>Setup</a:t>
             </a:r>
             <a:r>
-              <a:rPr lang="zh-CN" altLang="en-US" sz="2800" dirty="0" smtClean="0">
+              <a:rPr lang="zh-CN" altLang="en-US" sz="2800" dirty="0">
                 <a:solidFill>
                   <a:srgbClr val="000000"/>
                 </a:solidFill>
@@ -16878,7 +16837,7 @@
               <a:t> </a:t>
             </a:r>
             <a:r>
-              <a:rPr lang="en-US" altLang="zh-CN" sz="2800" dirty="0" err="1" smtClean="0">
+              <a:rPr lang="en-US" altLang="zh-CN" sz="2800" dirty="0" err="1">
                 <a:solidFill>
                   <a:srgbClr val="000000"/>
                 </a:solidFill>
@@ -16886,7 +16845,7 @@
               <a:t>Heroku</a:t>
             </a:r>
             <a:r>
-              <a:rPr lang="zh-CN" altLang="en-US" sz="2800" dirty="0" smtClean="0">
+              <a:rPr lang="zh-CN" altLang="en-US" sz="2800" dirty="0">
                 <a:solidFill>
                   <a:srgbClr val="000000"/>
                 </a:solidFill>
@@ -16894,7 +16853,7 @@
               <a:t> </a:t>
             </a:r>
             <a:r>
-              <a:rPr lang="en-US" altLang="zh-CN" sz="2800" dirty="0" smtClean="0">
+              <a:rPr lang="en-US" altLang="zh-CN" sz="2800" dirty="0">
                 <a:solidFill>
                   <a:srgbClr val="000000"/>
                 </a:solidFill>
@@ -16904,7 +16863,7 @@
           </a:p>
           <a:p>
             <a:pPr lvl="1"/>
-            <a:endParaRPr lang="en-US" sz="2800" dirty="0" smtClean="0"/>
+            <a:endParaRPr lang="en-US" sz="2800" dirty="0"/>
           </a:p>
           <a:p>
             <a:pPr marL="285750" indent="-285750">
@@ -16912,14 +16871,14 @@
               <a:buChar char="•"/>
             </a:pPr>
             <a:r>
-              <a:rPr lang="en-US" sz="2800" b="1" dirty="0" err="1" smtClean="0">
+              <a:rPr lang="en-US" sz="2800" b="1" dirty="0" err="1">
                 <a:solidFill>
                   <a:srgbClr val="000000"/>
                 </a:solidFill>
               </a:rPr>
               <a:t>WebSocketController</a:t>
             </a:r>
-            <a:endParaRPr lang="en-US" sz="2800" b="1" dirty="0" smtClean="0">
+            <a:endParaRPr lang="en-US" sz="2800" b="1" dirty="0">
               <a:solidFill>
                 <a:srgbClr val="000000"/>
               </a:solidFill>
@@ -16931,7 +16890,7 @@
               <a:buChar char="•"/>
             </a:pPr>
             <a:r>
-              <a:rPr lang="en-US" sz="2800" dirty="0" smtClean="0">
+              <a:rPr lang="en-US" sz="2800" dirty="0">
                 <a:solidFill>
                   <a:srgbClr val="000000"/>
                 </a:solidFill>
@@ -16939,7 +16898,7 @@
               <a:t>H</a:t>
             </a:r>
             <a:r>
-              <a:rPr lang="en-US" altLang="zh-CN" sz="2800" dirty="0" smtClean="0">
+              <a:rPr lang="en-US" altLang="zh-CN" sz="2800" dirty="0">
                 <a:solidFill>
                   <a:srgbClr val="000000"/>
                 </a:solidFill>
@@ -16947,7 +16906,7 @@
               <a:t>andle</a:t>
             </a:r>
             <a:r>
-              <a:rPr lang="zh-CN" altLang="en-US" sz="2800" dirty="0" smtClean="0">
+              <a:rPr lang="zh-CN" altLang="en-US" sz="2800" dirty="0">
                 <a:solidFill>
                   <a:srgbClr val="000000"/>
                 </a:solidFill>
@@ -16960,18 +16919,10 @@
                   <a:srgbClr val="000000"/>
                 </a:solidFill>
               </a:rPr>
-              <a:t>W</a:t>
-            </a:r>
-            <a:r>
-              <a:rPr lang="en-US" altLang="zh-CN" sz="2800" dirty="0" err="1" smtClean="0">
-                <a:solidFill>
-                  <a:srgbClr val="000000"/>
-                </a:solidFill>
-              </a:rPr>
-              <a:t>ebsocket</a:t>
-            </a:r>
-            <a:r>
-              <a:rPr lang="zh-CN" altLang="en-US" sz="2800" dirty="0" smtClean="0">
+              <a:t>Websocket</a:t>
+            </a:r>
+            <a:r>
+              <a:rPr lang="zh-CN" altLang="en-US" sz="2800" dirty="0">
                 <a:solidFill>
                   <a:srgbClr val="000000"/>
                 </a:solidFill>
@@ -16979,7 +16930,7 @@
               <a:t> </a:t>
             </a:r>
             <a:r>
-              <a:rPr lang="en-US" altLang="zh-CN" sz="2800" dirty="0" smtClean="0">
+              <a:rPr lang="en-US" altLang="zh-CN" sz="2800" dirty="0">
                 <a:solidFill>
                   <a:srgbClr val="000000"/>
                 </a:solidFill>
@@ -16987,7 +16938,7 @@
               <a:t>communications</a:t>
             </a:r>
             <a:r>
-              <a:rPr lang="zh-CN" altLang="en-US" sz="2800" dirty="0" smtClean="0">
+              <a:rPr lang="zh-CN" altLang="en-US" sz="2800" dirty="0">
                 <a:solidFill>
                   <a:srgbClr val="000000"/>
                 </a:solidFill>
@@ -16995,7 +16946,7 @@
               <a:t> </a:t>
             </a:r>
             <a:r>
-              <a:rPr lang="en-US" altLang="zh-CN" sz="2800" dirty="0" smtClean="0">
+              <a:rPr lang="en-US" altLang="zh-CN" sz="2800" dirty="0">
                 <a:solidFill>
                   <a:srgbClr val="000000"/>
                 </a:solidFill>
@@ -17003,7 +16954,7 @@
               <a:t>from</a:t>
             </a:r>
             <a:r>
-              <a:rPr lang="zh-CN" altLang="en-US" sz="2800" dirty="0" smtClean="0">
+              <a:rPr lang="zh-CN" altLang="en-US" sz="2800" dirty="0">
                 <a:solidFill>
                   <a:srgbClr val="000000"/>
                 </a:solidFill>
@@ -17011,7 +16962,7 @@
               <a:t> </a:t>
             </a:r>
             <a:r>
-              <a:rPr lang="en-US" altLang="zh-CN" sz="2800" dirty="0" smtClean="0">
+              <a:rPr lang="en-US" altLang="zh-CN" sz="2800" dirty="0">
                 <a:solidFill>
                   <a:srgbClr val="000000"/>
                 </a:solidFill>
@@ -17019,7 +16970,7 @@
               <a:t>client</a:t>
             </a:r>
             <a:r>
-              <a:rPr lang="zh-CN" altLang="en-US" sz="2800" dirty="0" smtClean="0">
+              <a:rPr lang="zh-CN" altLang="en-US" sz="2800" dirty="0">
                 <a:solidFill>
                   <a:srgbClr val="000000"/>
                 </a:solidFill>
@@ -17027,7 +16978,7 @@
               <a:t> </a:t>
             </a:r>
             <a:r>
-              <a:rPr lang="en-US" altLang="zh-CN" sz="2800" dirty="0" smtClean="0">
+              <a:rPr lang="en-US" altLang="zh-CN" sz="2800" dirty="0">
                 <a:solidFill>
                   <a:srgbClr val="000000"/>
                 </a:solidFill>
@@ -17041,22 +16992,22 @@
               <a:buChar char="•"/>
             </a:pPr>
             <a:r>
-              <a:rPr lang="en-US" sz="2800" dirty="0" smtClean="0"/>
+              <a:rPr lang="en-US" sz="2800" dirty="0"/>
               <a:t>Utilize</a:t>
             </a:r>
             <a:r>
-              <a:rPr lang="zh-CN" altLang="en-US" sz="2800" dirty="0" smtClean="0"/>
+              <a:rPr lang="zh-CN" altLang="en-US" sz="2800" dirty="0"/>
               <a:t> </a:t>
             </a:r>
             <a:r>
-              <a:rPr lang="en-US" altLang="zh-CN" sz="2800" dirty="0" err="1" smtClean="0"/>
+              <a:rPr lang="en-US" altLang="zh-CN" sz="2800" dirty="0" err="1"/>
               <a:t>DispatcherAdapter</a:t>
             </a:r>
             <a:r>
-              <a:rPr lang="zh-CN" altLang="en-US" sz="2800" dirty="0" smtClean="0"/>
+              <a:rPr lang="zh-CN" altLang="en-US" sz="2800" dirty="0"/>
               <a:t> </a:t>
             </a:r>
-            <a:endParaRPr lang="en-US" altLang="zh-CN" sz="2800" dirty="0" smtClean="0"/>
+            <a:endParaRPr lang="en-US" altLang="zh-CN" sz="2800" dirty="0"/>
           </a:p>
         </p:txBody>
       </p:sp>
@@ -17136,7 +17087,7 @@
           <a:lstStyle/>
           <a:p>
             <a:r>
-              <a:rPr lang="en-US" b="1" dirty="0" smtClean="0">
+              <a:rPr lang="en-US" b="1" dirty="0">
                 <a:solidFill>
                   <a:srgbClr val="000000"/>
                 </a:solidFill>
@@ -17144,7 +17095,7 @@
               <a:t>Model -</a:t>
             </a:r>
             <a:r>
-              <a:rPr lang="zh-CN" altLang="en-US" b="1" dirty="0" smtClean="0">
+              <a:rPr lang="zh-CN" altLang="en-US" b="1" dirty="0">
                 <a:solidFill>
                   <a:srgbClr val="000000"/>
                 </a:solidFill>
@@ -17152,7 +17103,7 @@
               <a:t> </a:t>
             </a:r>
             <a:r>
-              <a:rPr lang="en-US" b="1" dirty="0" smtClean="0">
+              <a:rPr lang="en-US" b="1" dirty="0">
                 <a:solidFill>
                   <a:srgbClr val="000000"/>
                 </a:solidFill>
@@ -17160,7 +17111,7 @@
               <a:t>Package</a:t>
             </a:r>
             <a:r>
-              <a:rPr lang="zh-CN" altLang="en-US" b="1" dirty="0" smtClean="0">
+              <a:rPr lang="zh-CN" altLang="en-US" b="1" dirty="0">
                 <a:solidFill>
                   <a:srgbClr val="000000"/>
                 </a:solidFill>
@@ -17168,7 +17119,7 @@
               <a:t> </a:t>
             </a:r>
             <a:r>
-              <a:rPr lang="en-US" b="1" dirty="0" err="1" smtClean="0">
+              <a:rPr lang="en-US" b="1" dirty="0" err="1">
                 <a:solidFill>
                   <a:srgbClr val="000000"/>
                 </a:solidFill>
@@ -17229,7 +17180,7 @@
           <a:lstStyle/>
           <a:p>
             <a:r>
-              <a:rPr lang="en-US" b="1" dirty="0" smtClean="0">
+              <a:rPr lang="en-US" b="1" dirty="0">
                 <a:solidFill>
                   <a:srgbClr val="000000"/>
                 </a:solidFill>
@@ -17237,7 +17188,7 @@
               <a:t>Model</a:t>
             </a:r>
             <a:r>
-              <a:rPr lang="zh-CN" altLang="en-US" b="1" dirty="0" smtClean="0">
+              <a:rPr lang="zh-CN" altLang="en-US" b="1" dirty="0">
                 <a:solidFill>
                   <a:srgbClr val="000000"/>
                 </a:solidFill>
@@ -17245,7 +17196,7 @@
               <a:t> </a:t>
             </a:r>
             <a:r>
-              <a:rPr lang="en-US" b="1" dirty="0" smtClean="0">
+              <a:rPr lang="en-US" b="1" dirty="0">
                 <a:solidFill>
                   <a:srgbClr val="000000"/>
                 </a:solidFill>
@@ -17253,7 +17204,7 @@
               <a:t>-</a:t>
             </a:r>
             <a:r>
-              <a:rPr lang="zh-CN" altLang="en-US" b="1" dirty="0" smtClean="0">
+              <a:rPr lang="zh-CN" altLang="en-US" b="1" dirty="0">
                 <a:solidFill>
                   <a:srgbClr val="000000"/>
                 </a:solidFill>
@@ -17261,7 +17212,7 @@
               <a:t> </a:t>
             </a:r>
             <a:r>
-              <a:rPr lang="en-US" b="1" dirty="0" smtClean="0">
+              <a:rPr lang="en-US" b="1" dirty="0">
                 <a:solidFill>
                   <a:srgbClr val="000000"/>
                 </a:solidFill>
@@ -17269,7 +17220,7 @@
               <a:t>Package</a:t>
             </a:r>
             <a:r>
-              <a:rPr lang="zh-CN" altLang="en-US" b="1" dirty="0" smtClean="0">
+              <a:rPr lang="zh-CN" altLang="en-US" b="1" dirty="0">
                 <a:solidFill>
                   <a:srgbClr val="000000"/>
                 </a:solidFill>
@@ -17277,7 +17228,7 @@
               <a:t> </a:t>
             </a:r>
             <a:r>
-              <a:rPr lang="en-US" b="1" dirty="0" err="1" smtClean="0">
+              <a:rPr lang="en-US" b="1" dirty="0" err="1">
                 <a:solidFill>
                   <a:srgbClr val="000000"/>
                 </a:solidFill>
@@ -17368,7 +17319,7 @@
           <a:lstStyle/>
           <a:p>
             <a:r>
-              <a:rPr lang="en-US" b="1" dirty="0" smtClean="0">
+              <a:rPr lang="en-US" b="1" dirty="0">
                 <a:solidFill>
                   <a:srgbClr val="000000"/>
                 </a:solidFill>
@@ -17376,7 +17327,7 @@
               <a:t>Model</a:t>
             </a:r>
             <a:r>
-              <a:rPr lang="zh-CN" altLang="en-US" b="1" dirty="0" smtClean="0">
+              <a:rPr lang="zh-CN" altLang="en-US" b="1" dirty="0">
                 <a:solidFill>
                   <a:srgbClr val="000000"/>
                 </a:solidFill>
@@ -17384,7 +17335,7 @@
               <a:t> </a:t>
             </a:r>
             <a:r>
-              <a:rPr lang="en-US" b="1" dirty="0" smtClean="0">
+              <a:rPr lang="en-US" b="1" dirty="0">
                 <a:solidFill>
                   <a:srgbClr val="000000"/>
                 </a:solidFill>
@@ -17392,7 +17343,7 @@
               <a:t>-</a:t>
             </a:r>
             <a:r>
-              <a:rPr lang="zh-CN" altLang="en-US" b="1" dirty="0" smtClean="0">
+              <a:rPr lang="zh-CN" altLang="en-US" b="1" dirty="0">
                 <a:solidFill>
                   <a:srgbClr val="000000"/>
                 </a:solidFill>
@@ -17400,7 +17351,7 @@
               <a:t> </a:t>
             </a:r>
             <a:r>
-              <a:rPr lang="en-US" b="1" dirty="0" smtClean="0">
+              <a:rPr lang="en-US" b="1" dirty="0">
                 <a:solidFill>
                   <a:srgbClr val="000000"/>
                 </a:solidFill>
@@ -17408,7 +17359,7 @@
               <a:t>Package</a:t>
             </a:r>
             <a:r>
-              <a:rPr lang="zh-CN" altLang="en-US" b="1" dirty="0" smtClean="0">
+              <a:rPr lang="zh-CN" altLang="en-US" b="1" dirty="0">
                 <a:solidFill>
                   <a:srgbClr val="000000"/>
                 </a:solidFill>
@@ -17416,18 +17367,13 @@
               <a:t> </a:t>
             </a:r>
             <a:r>
-              <a:rPr lang="en-US" b="1" dirty="0" smtClean="0">
+              <a:rPr lang="en-US" b="1" dirty="0">
                 <a:solidFill>
                   <a:srgbClr val="000000"/>
                 </a:solidFill>
               </a:rPr>
               <a:t>res</a:t>
             </a:r>
-            <a:endParaRPr lang="en-US" b="1" dirty="0">
-              <a:solidFill>
-                <a:srgbClr val="000000"/>
-              </a:solidFill>
-            </a:endParaRPr>
           </a:p>
         </p:txBody>
       </p:sp>
@@ -17507,18 +17453,13 @@
           <a:lstStyle/>
           <a:p>
             <a:r>
-              <a:rPr lang="en-US" b="1" dirty="0" smtClean="0">
+              <a:rPr lang="en-US" b="1" dirty="0">
                 <a:solidFill>
                   <a:srgbClr val="000000"/>
                 </a:solidFill>
               </a:rPr>
               <a:t>Demo</a:t>
             </a:r>
-            <a:endParaRPr lang="en-US" b="1" dirty="0">
-              <a:solidFill>
-                <a:srgbClr val="000000"/>
-              </a:solidFill>
-            </a:endParaRPr>
           </a:p>
         </p:txBody>
       </p:sp>
@@ -17716,35 +17657,19 @@
           <a:p>
             <a:r>
               <a:rPr kumimoji="1" lang="en-US" altLang="zh-CN" dirty="0"/>
-              <a:t>URL</a:t>
-            </a:r>
-            <a:r>
-              <a:rPr kumimoji="1" lang="en-US" altLang="zh-CN" dirty="0" smtClean="0"/>
-              <a:t>:</a:t>
-            </a:r>
-            <a:r>
-              <a:rPr kumimoji="1" lang="zh-CN" altLang="en-US" dirty="0" smtClean="0"/>
+              <a:t>URL:</a:t>
+            </a:r>
+            <a:r>
+              <a:rPr kumimoji="1" lang="zh-CN" altLang="en-US" dirty="0"/>
               <a:t>  </a:t>
-            </a:r>
-            <a:r>
-              <a:rPr kumimoji="1" lang="en-US" altLang="zh-CN" dirty="0" smtClean="0">
-                <a:hlinkClick r:id="rId2"/>
-              </a:rPr>
-              <a:t>http:</a:t>
             </a:r>
             <a:r>
               <a:rPr kumimoji="1" lang="en-US" altLang="zh-CN" dirty="0">
                 <a:hlinkClick r:id="rId2"/>
               </a:rPr>
-              <a:t>//chatapp-team-nullsleep.herokuapp.com</a:t>
-            </a:r>
-            <a:r>
-              <a:rPr kumimoji="1" lang="en-US" altLang="zh-CN" dirty="0" smtClean="0">
-                <a:hlinkClick r:id="rId2"/>
-              </a:rPr>
-              <a:t>/</a:t>
-            </a:r>
-            <a:endParaRPr kumimoji="1" lang="en-US" altLang="zh-CN" dirty="0" smtClean="0"/>
+              <a:t>https://chatapp-team-nullsleep.herokuapp.com/</a:t>
+            </a:r>
+            <a:endParaRPr kumimoji="1" lang="en-US" altLang="zh-CN" dirty="0"/>
           </a:p>
           <a:p>
             <a:endParaRPr kumimoji="1" lang="zh-CN" altLang="en-US" dirty="0"/>

</xml_diff>